<commit_message>
edit essay more beautiful
</commit_message>
<xml_diff>
--- a/DesignPatterns/slide_Design_Pattern.pptx
+++ b/DesignPatterns/slide_Design_Pattern.pptx
@@ -8,7 +8,7 @@
     <p:notesMasterId r:id="rId5"/>
   </p:notesMasterIdLst>
   <p:handoutMasterIdLst>
-    <p:handoutMasterId r:id="rId22"/>
+    <p:handoutMasterId r:id="rId24"/>
   </p:handoutMasterIdLst>
   <p:sldIdLst>
     <p:sldId id="256" r:id="rId3"/>
@@ -29,6 +29,8 @@
     <p:sldId id="273" r:id="rId19"/>
     <p:sldId id="274" r:id="rId20"/>
     <p:sldId id="275" r:id="rId21"/>
+    <p:sldId id="276" r:id="rId22"/>
+    <p:sldId id="280" r:id="rId23"/>
   </p:sldIdLst>
   <p:sldSz cx="12192000" cy="6858000"/>
   <p:notesSz cx="7103745" cy="10234295"/>
@@ -680,16 +682,8 @@
 </file>
 
 <file path=ppt/slideLayouts/slideLayout1.xml><?xml version="1.0" encoding="utf-8"?>
-<p:sldLayout xmlns:a="http://schemas.openxmlformats.org/drawingml/2006/main" xmlns:r="http://schemas.openxmlformats.org/officeDocument/2006/relationships" xmlns:p="http://schemas.openxmlformats.org/presentationml/2006/main" type="title" preserve="1" showMasterSp="0">
+<p:sldLayout xmlns:a="http://schemas.openxmlformats.org/drawingml/2006/main" xmlns:r="http://schemas.openxmlformats.org/officeDocument/2006/relationships" xmlns:p="http://schemas.openxmlformats.org/presentationml/2006/main" type="title" preserve="1">
   <p:cSld name="Title Slide">
-    <p:bg>
-      <p:bgPr>
-        <a:solidFill>
-          <a:schemeClr val="bg1"/>
-        </a:solidFill>
-        <a:effectLst/>
-      </p:bgPr>
-    </p:bg>
     <p:spTree>
       <p:nvGrpSpPr>
         <p:cNvPr id="1" name=""/>
@@ -3255,7 +3249,7 @@
     <p:bg>
       <p:bgPr>
         <a:solidFill>
-          <a:schemeClr val="bg1"/>
+          <a:schemeClr val="accent1"/>
         </a:solidFill>
         <a:effectLst/>
       </p:bgPr>
@@ -4689,7 +4683,25 @@
                   <a:schemeClr val="tx1"/>
                 </a:solidFill>
               </a:rPr>
-              <a:t> Factory (or Factory Method) is a creational design pattern that Define an interface for creating an object, but let subclasses decide which class to instantiate. Factory Method lets a class defer instantiation to subclasses.</a:t>
+              <a:t> </a:t>
+            </a:r>
+            <a:endParaRPr lang="en-US" sz="2800" i="1">
+              <a:solidFill>
+                <a:schemeClr val="tx1"/>
+              </a:solidFill>
+            </a:endParaRPr>
+          </a:p>
+          <a:p>
+            <a:pPr marL="914400" lvl="2" indent="0" algn="l">
+              <a:buNone/>
+            </a:pPr>
+            <a:r>
+              <a:rPr lang="en-US" sz="2800" i="1">
+                <a:solidFill>
+                  <a:schemeClr val="tx1"/>
+                </a:solidFill>
+              </a:rPr>
+              <a:t>Factory (or Factory Method) is a creational design pattern that Define an interface for creating an object, but let subclasses decide which class to instantiate. Factory Method lets a class defer instantiation to subclasses.</a:t>
             </a:r>
             <a:endParaRPr lang="en-US" sz="2800" b="1">
               <a:solidFill>
@@ -4790,7 +4802,7 @@
             </a:pPr>
             <a:r>
               <a:rPr lang="en-US" sz="2800"/>
-              <a:t>           It provide a flexible way to initial a object without keyword “new”. </a:t>
+              <a:t>           It provide a flexible way to initiantiate a object without keyword “new”. </a:t>
             </a:r>
             <a:endParaRPr lang="en-US" sz="2800"/>
           </a:p>
@@ -4800,7 +4812,7 @@
             </a:pPr>
             <a:r>
               <a:rPr lang="en-US" sz="2800"/>
-              <a:t>-  Its purpose is make your code loose coupled and more flexible.</a:t>
+              <a:t>-  Its purpose is make your code “loose coupled”, which is very useful in the “microservice” architecture now.</a:t>
             </a:r>
             <a:endParaRPr lang="en-US" sz="2800"/>
           </a:p>
@@ -4864,7 +4876,7 @@
         </p:nvSpPr>
         <p:spPr>
           <a:xfrm>
-            <a:off x="816610" y="1158240"/>
+            <a:off x="911225" y="1831975"/>
             <a:ext cx="979170" cy="485775"/>
           </a:xfrm>
           <a:prstGeom prst="rightArrow">
@@ -4957,13 +4969,11 @@
       <p:grpSpPr/>
       <p:pic>
         <p:nvPicPr>
-          <p:cNvPr id="9" name="Content Placeholder 8"/>
+          <p:cNvPr id="12" name="Picture 11"/>
           <p:cNvPicPr>
             <a:picLocks noChangeAspect="1"/>
           </p:cNvPicPr>
-          <p:nvPr>
-            <p:ph idx="1"/>
-          </p:nvPr>
+          <p:nvPr/>
         </p:nvPicPr>
         <p:blipFill>
           <a:blip r:embed="rId1"/>
@@ -4973,8 +4983,8 @@
         </p:blipFill>
         <p:spPr>
           <a:xfrm>
-            <a:off x="282575" y="240030"/>
-            <a:ext cx="6731000" cy="6051550"/>
+            <a:off x="6842125" y="2298065"/>
+            <a:ext cx="4664075" cy="4251960"/>
           </a:xfrm>
           <a:prstGeom prst="rect">
             <a:avLst/>
@@ -4983,11 +4993,13 @@
       </p:pic>
       <p:pic>
         <p:nvPicPr>
-          <p:cNvPr id="12" name="Picture 11"/>
+          <p:cNvPr id="14" name="Content Placeholder 13"/>
           <p:cNvPicPr>
             <a:picLocks noChangeAspect="1"/>
           </p:cNvPicPr>
-          <p:nvPr/>
+          <p:nvPr>
+            <p:ph idx="1"/>
+          </p:nvPr>
         </p:nvPicPr>
         <p:blipFill>
           <a:blip r:embed="rId2"/>
@@ -4997,8 +5009,8 @@
         </p:blipFill>
         <p:spPr>
           <a:xfrm>
-            <a:off x="7206615" y="2039620"/>
-            <a:ext cx="4664075" cy="4251960"/>
+            <a:off x="423545" y="514985"/>
+            <a:ext cx="5751195" cy="6035040"/>
           </a:xfrm>
           <a:prstGeom prst="rect">
             <a:avLst/>
@@ -5044,7 +5056,7 @@
           <a:p>
             <a:r>
               <a:rPr lang="en-US"/>
-              <a:t>But, your sir want to get </a:t>
+              <a:t>But, your sir want to add </a:t>
             </a:r>
             <a:r>
               <a:rPr lang="en-US">
@@ -5060,7 +5072,7 @@
                   <a:schemeClr val="tx1"/>
                 </a:solidFill>
               </a:rPr>
-              <a:t> How to extend? Now you need Factory Design Pattern.</a:t>
+              <a:t> </a:t>
             </a:r>
             <a:endParaRPr lang="en-US">
               <a:solidFill>
@@ -5069,6 +5081,24 @@
             </a:endParaRPr>
           </a:p>
           <a:p>
+            <a:pPr marL="0" indent="0">
+              <a:buNone/>
+            </a:pPr>
+            <a:r>
+              <a:rPr lang="en-US">
+                <a:solidFill>
+                  <a:schemeClr val="tx1"/>
+                </a:solidFill>
+              </a:rPr>
+              <a:t>   How to extend? Now you need Factory Pattern.</a:t>
+            </a:r>
+            <a:endParaRPr lang="en-US">
+              <a:solidFill>
+                <a:schemeClr val="tx1"/>
+              </a:solidFill>
+            </a:endParaRPr>
+          </a:p>
+          <a:p>
             <a:r>
               <a:rPr lang="en-US">
                 <a:solidFill>
@@ -5101,7 +5131,7 @@
       </p:sp>
       <p:pic>
         <p:nvPicPr>
-          <p:cNvPr id="4" name="Picture 3" descr="factory_uml"/>
+          <p:cNvPr id="5" name="Picture 4"/>
           <p:cNvPicPr>
             <a:picLocks noChangeAspect="1"/>
           </p:cNvPicPr>
@@ -5115,8 +5145,8 @@
         </p:blipFill>
         <p:spPr>
           <a:xfrm>
-            <a:off x="2961005" y="1158875"/>
-            <a:ext cx="8362950" cy="5200015"/>
+            <a:off x="2370455" y="1480185"/>
+            <a:ext cx="8258175" cy="5191125"/>
           </a:xfrm>
           <a:prstGeom prst="rect">
             <a:avLst/>
@@ -5160,7 +5190,7 @@
         <p:spPr>
           <a:xfrm>
             <a:off x="958850" y="534670"/>
-            <a:ext cx="3924300" cy="2581275"/>
+            <a:ext cx="3924300" cy="2687955"/>
           </a:xfrm>
           <a:prstGeom prst="rect">
             <a:avLst/>
@@ -5184,7 +5214,7 @@
         <p:spPr>
           <a:xfrm>
             <a:off x="958850" y="3115945"/>
-            <a:ext cx="3924300" cy="2581275"/>
+            <a:ext cx="3924300" cy="2903855"/>
           </a:xfrm>
           <a:prstGeom prst="rect">
             <a:avLst/>
@@ -5207,8 +5237,8 @@
         </p:blipFill>
         <p:spPr>
           <a:xfrm>
-            <a:off x="5558155" y="534670"/>
-            <a:ext cx="4533900" cy="5391150"/>
+            <a:off x="5288280" y="535305"/>
+            <a:ext cx="5948680" cy="5484495"/>
           </a:xfrm>
           <a:prstGeom prst="rect">
             <a:avLst/>
@@ -5279,7 +5309,7 @@
       <p:grpSpPr/>
       <p:pic>
         <p:nvPicPr>
-          <p:cNvPr id="6" name="Content Placeholder 5"/>
+          <p:cNvPr id="12" name="Content Placeholder 11"/>
           <p:cNvPicPr>
             <a:picLocks noChangeAspect="1"/>
           </p:cNvPicPr>
@@ -5295,17 +5325,49 @@
         </p:blipFill>
         <p:spPr>
           <a:xfrm>
-            <a:off x="3066415" y="342265"/>
-            <a:ext cx="8375015" cy="4128770"/>
+            <a:off x="453390" y="222885"/>
+            <a:ext cx="8426450" cy="3994150"/>
           </a:xfrm>
           <a:prstGeom prst="rect">
             <a:avLst/>
           </a:prstGeom>
         </p:spPr>
       </p:pic>
+      <p:sp>
+        <p:nvSpPr>
+          <p:cNvPr id="16" name="Text Box 15"/>
+          <p:cNvSpPr txBox="1"/>
+          <p:nvPr/>
+        </p:nvSpPr>
+        <p:spPr>
+          <a:xfrm>
+            <a:off x="843280" y="4418965"/>
+            <a:ext cx="999490" cy="368300"/>
+          </a:xfrm>
+          <a:prstGeom prst="rect">
+            <a:avLst/>
+          </a:prstGeom>
+          <a:noFill/>
+        </p:spPr>
+        <p:txBody>
+          <a:bodyPr wrap="none" rtlCol="0">
+            <a:spAutoFit/>
+          </a:bodyPr>
+          <a:p>
+            <a:pPr algn="l"/>
+            <a:r>
+              <a:rPr lang="en-US" b="1">
+                <a:sym typeface="+mn-ea"/>
+              </a:rPr>
+              <a:t>Result</a:t>
+            </a:r>
+            <a:endParaRPr lang="en-US" b="1"/>
+          </a:p>
+        </p:txBody>
+      </p:sp>
       <p:pic>
         <p:nvPicPr>
-          <p:cNvPr id="7" name="Picture 6" descr="resultFactory"/>
+          <p:cNvPr id="17" name="Picture 16"/>
           <p:cNvPicPr>
             <a:picLocks noChangeAspect="1"/>
           </p:cNvPicPr>
@@ -5319,43 +5381,227 @@
         </p:blipFill>
         <p:spPr>
           <a:xfrm>
-            <a:off x="609600" y="4765040"/>
-            <a:ext cx="10708005" cy="1480820"/>
+            <a:off x="1153160" y="4989195"/>
+            <a:ext cx="4307840" cy="1404620"/>
           </a:xfrm>
           <a:prstGeom prst="rect">
             <a:avLst/>
           </a:prstGeom>
         </p:spPr>
       </p:pic>
-      <p:sp>
-        <p:nvSpPr>
-          <p:cNvPr id="10" name="Text Box 9"/>
-          <p:cNvSpPr txBox="1"/>
-          <p:nvPr/>
+    </p:spTree>
+  </p:cSld>
+  <p:clrMapOvr>
+    <a:masterClrMapping/>
+  </p:clrMapOvr>
+</p:sld>
+</file>
+
+<file path=ppt/slides/slide19.xml><?xml version="1.0" encoding="utf-8"?>
+<p:sld xmlns:a="http://schemas.openxmlformats.org/drawingml/2006/main" xmlns:r="http://schemas.openxmlformats.org/officeDocument/2006/relationships" xmlns:p="http://schemas.openxmlformats.org/presentationml/2006/main">
+  <p:cSld>
+    <p:spTree>
+      <p:nvGrpSpPr>
+        <p:cNvPr id="1" name=""/>
+        <p:cNvGrpSpPr/>
+        <p:nvPr/>
+      </p:nvGrpSpPr>
+      <p:grpSpPr/>
+      <p:sp>
+        <p:nvSpPr>
+          <p:cNvPr id="2" name="Title 1"/>
+          <p:cNvSpPr>
+            <a:spLocks noGrp="1"/>
+          </p:cNvSpPr>
+          <p:nvPr>
+            <p:ph type="title"/>
+          </p:nvPr>
         </p:nvSpPr>
         <p:spPr>
           <a:xfrm>
-            <a:off x="1261110" y="4217035"/>
-            <a:ext cx="999490" cy="368300"/>
+            <a:off x="434340" y="591820"/>
+            <a:ext cx="10972800" cy="582613"/>
           </a:xfrm>
-          <a:prstGeom prst="rect">
-            <a:avLst/>
-          </a:prstGeom>
-          <a:noFill/>
         </p:spPr>
         <p:txBody>
-          <a:bodyPr wrap="none" rtlCol="0">
-            <a:spAutoFit/>
-          </a:bodyPr>
-          <a:p>
-            <a:pPr algn="l"/>
-            <a:r>
-              <a:rPr lang="en-US" b="1">
-                <a:sym typeface="+mn-ea"/>
-              </a:rPr>
-              <a:t>Result</a:t>
-            </a:r>
-            <a:endParaRPr lang="en-US" b="1"/>
+          <a:bodyPr/>
+          <a:p>
+            <a:r>
+              <a:rPr lang="en-US" sz="3200">
+                <a:solidFill>
+                  <a:srgbClr val="00B0F0"/>
+                </a:solidFill>
+              </a:rPr>
+              <a:t>b, MVC - the “legendary” architecture/design </a:t>
+            </a:r>
+            <a:br>
+              <a:rPr lang="en-US" sz="3200">
+                <a:solidFill>
+                  <a:srgbClr val="00B0F0"/>
+                </a:solidFill>
+              </a:rPr>
+            </a:br>
+            <a:r>
+              <a:rPr lang="en-US" sz="3200">
+                <a:solidFill>
+                  <a:srgbClr val="00B0F0"/>
+                </a:solidFill>
+              </a:rPr>
+              <a:t>pattern</a:t>
+            </a:r>
+            <a:br>
+              <a:rPr lang="en-US" sz="3200">
+                <a:solidFill>
+                  <a:srgbClr val="00B0F0"/>
+                </a:solidFill>
+              </a:rPr>
+            </a:br>
+            <a:endParaRPr lang="en-US" sz="3200">
+              <a:solidFill>
+                <a:srgbClr val="00B0F0"/>
+              </a:solidFill>
+            </a:endParaRPr>
+          </a:p>
+        </p:txBody>
+      </p:sp>
+      <p:sp>
+        <p:nvSpPr>
+          <p:cNvPr id="3" name="Content Placeholder 2"/>
+          <p:cNvSpPr>
+            <a:spLocks noGrp="1"/>
+          </p:cNvSpPr>
+          <p:nvPr>
+            <p:ph idx="1"/>
+          </p:nvPr>
+        </p:nvSpPr>
+        <p:spPr/>
+        <p:txBody>
+          <a:bodyPr/>
+          <a:p>
+            <a:pPr marL="0" indent="0">
+              <a:buNone/>
+            </a:pPr>
+            <a:r>
+              <a:rPr lang="en-US" sz="2000"/>
+              <a:t>https://github.com/duyhelloworld/java-learning/tree/main/DesignPatterns/mvc</a:t>
+            </a:r>
+            <a:endParaRPr lang="en-US" sz="2000"/>
+          </a:p>
+          <a:p>
+            <a:pPr marL="0" indent="0">
+              <a:buNone/>
+            </a:pPr>
+            <a:endParaRPr lang="en-US"/>
+          </a:p>
+          <a:p>
+            <a:pPr marL="0" indent="0">
+              <a:buNone/>
+            </a:pPr>
+            <a:r>
+              <a:rPr lang="en-US">
+                <a:solidFill>
+                  <a:srgbClr val="7030A0"/>
+                </a:solidFill>
+              </a:rPr>
+              <a:t>2. Link some references : </a:t>
+            </a:r>
+            <a:endParaRPr lang="en-US">
+              <a:solidFill>
+                <a:srgbClr val="7030A0"/>
+              </a:solidFill>
+            </a:endParaRPr>
+          </a:p>
+          <a:p>
+            <a:pPr marL="0" indent="0">
+              <a:buNone/>
+            </a:pPr>
+            <a:r>
+              <a:rPr lang="en-US" sz="2800">
+                <a:solidFill>
+                  <a:srgbClr val="7030A0"/>
+                </a:solidFill>
+              </a:rPr>
+              <a:t>- https://gpcoder.com/4164-gioi-thieu-design-patterns/</a:t>
+            </a:r>
+            <a:endParaRPr lang="en-US" sz="2800">
+              <a:solidFill>
+                <a:srgbClr val="7030A0"/>
+              </a:solidFill>
+            </a:endParaRPr>
+          </a:p>
+          <a:p>
+            <a:pPr marL="0" indent="0">
+              <a:buNone/>
+            </a:pPr>
+            <a:r>
+              <a:rPr lang="en-US" sz="2800">
+                <a:solidFill>
+                  <a:srgbClr val="7030A0"/>
+                </a:solidFill>
+              </a:rPr>
+              <a:t>- https://www.red-gate.com/simple-talk/blogs/why-following-design-patterns-is-a-bad-idea/</a:t>
+            </a:r>
+            <a:endParaRPr lang="en-US" sz="2800">
+              <a:solidFill>
+                <a:srgbClr val="7030A0"/>
+              </a:solidFill>
+            </a:endParaRPr>
+          </a:p>
+          <a:p>
+            <a:pPr marL="0" indent="0">
+              <a:buNone/>
+            </a:pPr>
+            <a:r>
+              <a:rPr lang="en-US" sz="2800">
+                <a:solidFill>
+                  <a:srgbClr val="7030A0"/>
+                </a:solidFill>
+              </a:rPr>
+              <a:t>- https://sourcemaking.com/design_patterns</a:t>
+            </a:r>
+            <a:endParaRPr lang="en-US" sz="2800">
+              <a:solidFill>
+                <a:srgbClr val="7030A0"/>
+              </a:solidFill>
+            </a:endParaRPr>
+          </a:p>
+          <a:p>
+            <a:pPr marL="0" indent="0">
+              <a:buNone/>
+            </a:pPr>
+            <a:r>
+              <a:rPr lang="en-US" sz="2800">
+                <a:solidFill>
+                  <a:srgbClr val="7030A0"/>
+                </a:solidFill>
+              </a:rPr>
+              <a:t>- https://github.com/ajitpal/BookBank (Head First Design Pattern)</a:t>
+            </a:r>
+            <a:endParaRPr lang="en-US" sz="2800">
+              <a:solidFill>
+                <a:srgbClr val="7030A0"/>
+              </a:solidFill>
+            </a:endParaRPr>
+          </a:p>
+          <a:p>
+            <a:pPr marL="0" indent="0">
+              <a:buNone/>
+            </a:pPr>
+            <a:endParaRPr lang="en-US" sz="2800">
+              <a:solidFill>
+                <a:srgbClr val="7030A0"/>
+              </a:solidFill>
+            </a:endParaRPr>
+          </a:p>
+          <a:p>
+            <a:pPr marL="0" indent="0">
+              <a:buNone/>
+            </a:pPr>
+            <a:endParaRPr lang="en-US" sz="2800">
+              <a:solidFill>
+                <a:srgbClr val="7030A0"/>
+              </a:solidFill>
+            </a:endParaRPr>
           </a:p>
         </p:txBody>
       </p:sp>
@@ -5370,9 +5616,274 @@
 <file path=ppt/slides/slide2.xml><?xml version="1.0" encoding="utf-8"?>
 <p:sld xmlns:a="http://schemas.openxmlformats.org/drawingml/2006/main" xmlns:r="http://schemas.openxmlformats.org/officeDocument/2006/relationships" xmlns:p="http://schemas.openxmlformats.org/presentationml/2006/main">
   <p:cSld>
+    <p:spTree>
+      <p:nvGrpSpPr>
+        <p:cNvPr id="1" name=""/>
+        <p:cNvGrpSpPr/>
+        <p:nvPr/>
+      </p:nvGrpSpPr>
+      <p:grpSpPr/>
+      <p:sp>
+        <p:nvSpPr>
+          <p:cNvPr id="2" name="Title 1"/>
+          <p:cNvSpPr>
+            <a:spLocks noGrp="1"/>
+          </p:cNvSpPr>
+          <p:nvPr>
+            <p:ph type="title"/>
+          </p:nvPr>
+        </p:nvSpPr>
+        <p:spPr>
+          <a:xfrm>
+            <a:off x="609600" y="274955"/>
+            <a:ext cx="10972800" cy="617220"/>
+          </a:xfrm>
+        </p:spPr>
+        <p:txBody>
+          <a:bodyPr/>
+          <a:p>
+            <a:r>
+              <a:rPr lang="vi-VN" altLang="en-US">
+                <a:solidFill>
+                  <a:schemeClr val="accent3">
+                    <a:lumMod val="10000"/>
+                  </a:schemeClr>
+                </a:solidFill>
+              </a:rPr>
+              <a:t>C</a:t>
+            </a:r>
+            <a:r>
+              <a:rPr lang="en-US" altLang="vi-VN">
+                <a:solidFill>
+                  <a:schemeClr val="accent3">
+                    <a:lumMod val="10000"/>
+                  </a:schemeClr>
+                </a:solidFill>
+              </a:rPr>
+              <a:t>atalogue</a:t>
+            </a:r>
+            <a:endParaRPr lang="en-US" altLang="vi-VN">
+              <a:solidFill>
+                <a:schemeClr val="accent3">
+                  <a:lumMod val="10000"/>
+                </a:schemeClr>
+              </a:solidFill>
+            </a:endParaRPr>
+          </a:p>
+        </p:txBody>
+      </p:sp>
+      <p:sp>
+        <p:nvSpPr>
+          <p:cNvPr id="3" name="Content Placeholder 2"/>
+          <p:cNvSpPr>
+            <a:spLocks noGrp="1"/>
+          </p:cNvSpPr>
+          <p:nvPr>
+            <p:ph idx="1"/>
+          </p:nvPr>
+        </p:nvSpPr>
+        <p:spPr>
+          <a:xfrm>
+            <a:off x="609600" y="1101725"/>
+            <a:ext cx="10972800" cy="5011420"/>
+          </a:xfrm>
+        </p:spPr>
+        <p:txBody>
+          <a:bodyPr/>
+          <a:p>
+            <a:r>
+              <a:rPr lang="en-US" i="1">
+                <a:solidFill>
+                  <a:srgbClr val="FF6600"/>
+                </a:solidFill>
+              </a:rPr>
+              <a:t>Chapter 1 : Overview about Design Patterns</a:t>
+            </a:r>
+            <a:endParaRPr lang="en-US" i="1">
+              <a:solidFill>
+                <a:srgbClr val="FF6600"/>
+              </a:solidFill>
+            </a:endParaRPr>
+          </a:p>
+          <a:p>
+            <a:pPr marL="971550" lvl="1" indent="-514350" algn="l">
+              <a:buFont typeface="Arial" panose="02080604020202020204" pitchFamily="34" charset="0"/>
+              <a:buAutoNum type="arabicPeriod"/>
+            </a:pPr>
+            <a:r>
+              <a:rPr lang="en-US">
+                <a:solidFill>
+                  <a:schemeClr val="bg2"/>
+                </a:solidFill>
+              </a:rPr>
+              <a:t>Definition and History</a:t>
+            </a:r>
+            <a:endParaRPr lang="en-US">
+              <a:solidFill>
+                <a:schemeClr val="bg2"/>
+              </a:solidFill>
+            </a:endParaRPr>
+          </a:p>
+          <a:p>
+            <a:pPr marL="971550" lvl="1" indent="-514350" algn="l">
+              <a:buFont typeface="Arial" panose="02080604020202020204" pitchFamily="34" charset="0"/>
+              <a:buAutoNum type="arabicPeriod"/>
+            </a:pPr>
+            <a:r>
+              <a:rPr lang="en-US">
+                <a:solidFill>
+                  <a:schemeClr val="bg2"/>
+                </a:solidFill>
+              </a:rPr>
+              <a:t>Characterists &amp; Structure of a DP</a:t>
+            </a:r>
+            <a:endParaRPr lang="en-US">
+              <a:solidFill>
+                <a:schemeClr val="bg2"/>
+              </a:solidFill>
+            </a:endParaRPr>
+          </a:p>
+          <a:p>
+            <a:pPr marL="971550" lvl="1" indent="-514350" algn="l">
+              <a:buFont typeface="Arial" panose="02080604020202020204" pitchFamily="34" charset="0"/>
+              <a:buAutoNum type="arabicPeriod"/>
+            </a:pPr>
+            <a:r>
+              <a:rPr lang="en-US">
+                <a:solidFill>
+                  <a:schemeClr val="bg2"/>
+                </a:solidFill>
+              </a:rPr>
+              <a:t>Types of Design Patterns</a:t>
+            </a:r>
+            <a:endParaRPr lang="en-US">
+              <a:solidFill>
+                <a:schemeClr val="bg2"/>
+              </a:solidFill>
+            </a:endParaRPr>
+          </a:p>
+          <a:p>
+            <a:pPr marL="971550" lvl="1" indent="-514350" algn="l">
+              <a:buFont typeface="Arial" panose="02080604020202020204" pitchFamily="34" charset="0"/>
+              <a:buAutoNum type="arabicPeriod"/>
+            </a:pPr>
+            <a:r>
+              <a:rPr lang="en-US">
+                <a:solidFill>
+                  <a:schemeClr val="bg2"/>
+                </a:solidFill>
+              </a:rPr>
+              <a:t>Pros and Cons </a:t>
+            </a:r>
+            <a:endParaRPr lang="en-US">
+              <a:solidFill>
+                <a:schemeClr val="bg2"/>
+              </a:solidFill>
+            </a:endParaRPr>
+          </a:p>
+          <a:p>
+            <a:pPr marL="971550" lvl="1" indent="-514350" algn="l">
+              <a:buFont typeface="Arial" panose="02080604020202020204" pitchFamily="34" charset="0"/>
+              <a:buAutoNum type="arabicPeriod"/>
+            </a:pPr>
+            <a:r>
+              <a:rPr lang="en-US">
+                <a:solidFill>
+                  <a:schemeClr val="bg2"/>
+                </a:solidFill>
+              </a:rPr>
+              <a:t>Issues when learning</a:t>
+            </a:r>
+            <a:endParaRPr lang="en-US">
+              <a:solidFill>
+                <a:schemeClr val="bg2"/>
+              </a:solidFill>
+            </a:endParaRPr>
+          </a:p>
+          <a:p>
+            <a:r>
+              <a:rPr lang="en-US" i="1">
+                <a:solidFill>
+                  <a:srgbClr val="FF6600"/>
+                </a:solidFill>
+              </a:rPr>
+              <a:t>Chapter 2 : Code Example</a:t>
+            </a:r>
+            <a:endParaRPr lang="en-US" i="1">
+              <a:solidFill>
+                <a:srgbClr val="FF6600"/>
+              </a:solidFill>
+            </a:endParaRPr>
+          </a:p>
+          <a:p>
+            <a:pPr marL="971550" lvl="1" indent="-514350">
+              <a:buAutoNum type="arabicPeriod"/>
+            </a:pPr>
+            <a:r>
+              <a:rPr lang="en-US" sz="2800">
+                <a:solidFill>
+                  <a:schemeClr val="bg2"/>
+                </a:solidFill>
+              </a:rPr>
+              <a:t>Implement of Factory and MVC</a:t>
+            </a:r>
+            <a:endParaRPr lang="en-US" sz="2800">
+              <a:solidFill>
+                <a:schemeClr val="bg2"/>
+              </a:solidFill>
+            </a:endParaRPr>
+          </a:p>
+          <a:p>
+            <a:pPr marL="971550" lvl="1" indent="-514350">
+              <a:buAutoNum type="arabicPeriod"/>
+            </a:pPr>
+            <a:r>
+              <a:rPr lang="en-US" sz="2800">
+                <a:solidFill>
+                  <a:schemeClr val="bg2"/>
+                </a:solidFill>
+              </a:rPr>
+              <a:t>Link of some references</a:t>
+            </a:r>
+            <a:r>
+              <a:rPr lang="en-US" sz="2800"/>
+              <a:t> </a:t>
+            </a:r>
+            <a:endParaRPr lang="en-US" sz="2800"/>
+          </a:p>
+          <a:p>
+            <a:pPr marL="971550" lvl="1" indent="-514350">
+              <a:buAutoNum type="arabicPeriod"/>
+            </a:pPr>
+            <a:endParaRPr lang="en-US"/>
+          </a:p>
+          <a:p>
+            <a:pPr marL="971550" lvl="1" indent="-514350">
+              <a:buAutoNum type="arabicPeriod"/>
+            </a:pPr>
+            <a:endParaRPr lang="en-US"/>
+          </a:p>
+        </p:txBody>
+      </p:sp>
+    </p:spTree>
+  </p:cSld>
+  <p:clrMapOvr>
+    <a:masterClrMapping/>
+  </p:clrMapOvr>
+</p:sld>
+</file>
+
+<file path=ppt/slides/slide20.xml><?xml version="1.0" encoding="utf-8"?>
+<p:sld xmlns:a="http://schemas.openxmlformats.org/drawingml/2006/main" xmlns:r="http://schemas.openxmlformats.org/officeDocument/2006/relationships" xmlns:p="http://schemas.openxmlformats.org/presentationml/2006/main">
+  <p:cSld>
     <p:bg>
       <p:bgPr>
-        <a:noFill/>
+        <a:blipFill rotWithShape="1">
+          <a:blip r:embed="rId1"/>
+          <a:stretch>
+            <a:fillRect/>
+          </a:stretch>
+        </a:blipFill>
         <a:effectLst/>
       </p:bgPr>
     </p:bg>
@@ -5383,245 +5894,64 @@
         <p:nvPr/>
       </p:nvGrpSpPr>
       <p:grpSpPr/>
-      <p:sp>
-        <p:nvSpPr>
-          <p:cNvPr id="2" name="Title 1"/>
-          <p:cNvSpPr>
-            <a:spLocks noGrp="1"/>
-          </p:cNvSpPr>
-          <p:nvPr>
-            <p:ph type="title"/>
-          </p:nvPr>
-        </p:nvSpPr>
+      <p:pic>
+        <p:nvPicPr>
+          <p:cNvPr id="5" name="Picture 4" descr="coding-lofi"/>
+          <p:cNvPicPr>
+            <a:picLocks noChangeAspect="1"/>
+          </p:cNvPicPr>
+          <p:nvPr/>
+        </p:nvPicPr>
+        <p:blipFill>
+          <a:blip r:embed="rId2"/>
+          <a:stretch>
+            <a:fillRect/>
+          </a:stretch>
+        </p:blipFill>
         <p:spPr>
           <a:xfrm>
-            <a:off x="609600" y="274955"/>
-            <a:ext cx="10972800" cy="617220"/>
+            <a:off x="955040" y="0"/>
+            <a:ext cx="11236960" cy="7005955"/>
           </a:xfrm>
+          <a:prstGeom prst="rect">
+            <a:avLst/>
+          </a:prstGeom>
         </p:spPr>
-        <p:txBody>
-          <a:bodyPr/>
-          <a:p>
-            <a:r>
-              <a:rPr lang="vi-VN" altLang="en-US">
-                <a:solidFill>
-                  <a:schemeClr val="accent3">
-                    <a:lumMod val="10000"/>
-                  </a:schemeClr>
-                </a:solidFill>
-              </a:rPr>
-              <a:t>C</a:t>
-            </a:r>
-            <a:r>
-              <a:rPr lang="en-US" altLang="vi-VN">
-                <a:solidFill>
-                  <a:schemeClr val="accent3">
-                    <a:lumMod val="10000"/>
-                  </a:schemeClr>
-                </a:solidFill>
-              </a:rPr>
-              <a:t>atalogue</a:t>
-            </a:r>
-            <a:endParaRPr lang="en-US" altLang="vi-VN">
+      </p:pic>
+      <p:sp>
+        <p:nvSpPr>
+          <p:cNvPr id="6" name="Text Box 5"/>
+          <p:cNvSpPr txBox="1"/>
+          <p:nvPr/>
+        </p:nvSpPr>
+        <p:spPr>
+          <a:xfrm>
+            <a:off x="3861435" y="2654300"/>
+            <a:ext cx="5901055" cy="583565"/>
+          </a:xfrm>
+          <a:prstGeom prst="rect">
+            <a:avLst/>
+          </a:prstGeom>
+          <a:noFill/>
+        </p:spPr>
+        <p:txBody>
+          <a:bodyPr wrap="square" rtlCol="0">
+            <a:spAutoFit/>
+          </a:bodyPr>
+          <a:p>
+            <a:r>
+              <a:rPr lang="en-US" sz="3200" b="1">
+                <a:solidFill>
+                  <a:srgbClr val="00B050"/>
+                </a:solidFill>
+              </a:rPr>
+              <a:t>Thank you for listening!</a:t>
+            </a:r>
+            <a:endParaRPr lang="en-US" sz="3200" b="1">
               <a:solidFill>
-                <a:schemeClr val="accent3">
-                  <a:lumMod val="10000"/>
-                </a:schemeClr>
+                <a:srgbClr val="00B050"/>
               </a:solidFill>
             </a:endParaRPr>
-          </a:p>
-        </p:txBody>
-      </p:sp>
-      <p:sp>
-        <p:nvSpPr>
-          <p:cNvPr id="3" name="Content Placeholder 2"/>
-          <p:cNvSpPr>
-            <a:spLocks noGrp="1"/>
-          </p:cNvSpPr>
-          <p:nvPr>
-            <p:ph idx="1"/>
-          </p:nvPr>
-        </p:nvSpPr>
-        <p:spPr>
-          <a:xfrm>
-            <a:off x="609600" y="1101725"/>
-            <a:ext cx="10972800" cy="5011420"/>
-          </a:xfrm>
-        </p:spPr>
-        <p:txBody>
-          <a:bodyPr/>
-          <a:p>
-            <a:r>
-              <a:rPr lang="en-US" i="1">
-                <a:solidFill>
-                  <a:srgbClr val="FF6600"/>
-                </a:solidFill>
-              </a:rPr>
-              <a:t>Chapter 1 : Overview about Design Patterns</a:t>
-            </a:r>
-            <a:endParaRPr lang="en-US" i="1">
-              <a:solidFill>
-                <a:srgbClr val="FF6600"/>
-              </a:solidFill>
-            </a:endParaRPr>
-          </a:p>
-          <a:p>
-            <a:pPr marL="971550" lvl="1" indent="-514350" algn="l">
-              <a:buFont typeface="Arial" panose="02080604020202020204" pitchFamily="34" charset="0"/>
-              <a:buAutoNum type="arabicPeriod"/>
-            </a:pPr>
-            <a:r>
-              <a:rPr lang="en-US">
-                <a:solidFill>
-                  <a:schemeClr val="bg2"/>
-                </a:solidFill>
-              </a:rPr>
-              <a:t>Definition and History</a:t>
-            </a:r>
-            <a:endParaRPr lang="en-US">
-              <a:solidFill>
-                <a:schemeClr val="bg2"/>
-              </a:solidFill>
-            </a:endParaRPr>
-          </a:p>
-          <a:p>
-            <a:pPr marL="971550" lvl="1" indent="-514350" algn="l">
-              <a:buFont typeface="Arial" panose="02080604020202020204" pitchFamily="34" charset="0"/>
-              <a:buAutoNum type="arabicPeriod"/>
-            </a:pPr>
-            <a:r>
-              <a:rPr lang="en-US">
-                <a:solidFill>
-                  <a:schemeClr val="bg2"/>
-                </a:solidFill>
-              </a:rPr>
-              <a:t>Characterists &amp; Structure of a DP</a:t>
-            </a:r>
-            <a:endParaRPr lang="en-US">
-              <a:solidFill>
-                <a:schemeClr val="bg2"/>
-              </a:solidFill>
-            </a:endParaRPr>
-          </a:p>
-          <a:p>
-            <a:pPr marL="971550" lvl="1" indent="-514350" algn="l">
-              <a:buFont typeface="Arial" panose="02080604020202020204" pitchFamily="34" charset="0"/>
-              <a:buAutoNum type="arabicPeriod"/>
-            </a:pPr>
-            <a:r>
-              <a:rPr lang="en-US">
-                <a:solidFill>
-                  <a:schemeClr val="bg2"/>
-                </a:solidFill>
-              </a:rPr>
-              <a:t>Types of Design Patterns</a:t>
-            </a:r>
-            <a:endParaRPr lang="en-US">
-              <a:solidFill>
-                <a:schemeClr val="bg2"/>
-              </a:solidFill>
-            </a:endParaRPr>
-          </a:p>
-          <a:p>
-            <a:pPr marL="971550" lvl="1" indent="-514350" algn="l">
-              <a:buFont typeface="Arial" panose="02080604020202020204" pitchFamily="34" charset="0"/>
-              <a:buAutoNum type="arabicPeriod"/>
-            </a:pPr>
-            <a:r>
-              <a:rPr lang="en-US">
-                <a:solidFill>
-                  <a:schemeClr val="bg2"/>
-                </a:solidFill>
-              </a:rPr>
-              <a:t>Pros and Cons </a:t>
-            </a:r>
-            <a:endParaRPr lang="en-US">
-              <a:solidFill>
-                <a:schemeClr val="bg2"/>
-              </a:solidFill>
-            </a:endParaRPr>
-          </a:p>
-          <a:p>
-            <a:pPr marL="971550" lvl="1" indent="-514350" algn="l">
-              <a:buFont typeface="Arial" panose="02080604020202020204" pitchFamily="34" charset="0"/>
-              <a:buAutoNum type="arabicPeriod"/>
-            </a:pPr>
-            <a:r>
-              <a:rPr lang="en-US">
-                <a:solidFill>
-                  <a:schemeClr val="bg2"/>
-                </a:solidFill>
-              </a:rPr>
-              <a:t>Issues when learning</a:t>
-            </a:r>
-            <a:endParaRPr lang="en-US">
-              <a:solidFill>
-                <a:schemeClr val="bg2"/>
-              </a:solidFill>
-            </a:endParaRPr>
-          </a:p>
-          <a:p>
-            <a:r>
-              <a:rPr lang="en-US" i="1">
-                <a:solidFill>
-                  <a:srgbClr val="FF6600"/>
-                </a:solidFill>
-              </a:rPr>
-              <a:t>Chapter 2 : Code Example</a:t>
-            </a:r>
-            <a:endParaRPr lang="en-US" i="1">
-              <a:solidFill>
-                <a:srgbClr val="FF6600"/>
-              </a:solidFill>
-            </a:endParaRPr>
-          </a:p>
-          <a:p>
-            <a:pPr marL="971550" lvl="1" indent="-514350">
-              <a:buAutoNum type="arabicPeriod"/>
-            </a:pPr>
-            <a:r>
-              <a:rPr lang="en-US" sz="2800">
-                <a:solidFill>
-                  <a:schemeClr val="bg2"/>
-                </a:solidFill>
-              </a:rPr>
-              <a:t>Implement of Factory and MVC</a:t>
-            </a:r>
-            <a:endParaRPr lang="en-US" sz="2800">
-              <a:solidFill>
-                <a:schemeClr val="bg2"/>
-              </a:solidFill>
-            </a:endParaRPr>
-          </a:p>
-          <a:p>
-            <a:pPr marL="971550" lvl="1" indent="-514350">
-              <a:buAutoNum type="arabicPeriod"/>
-            </a:pPr>
-            <a:r>
-              <a:rPr lang="en-US" sz="2800">
-                <a:solidFill>
-                  <a:schemeClr val="bg2"/>
-                </a:solidFill>
-              </a:rPr>
-              <a:t>Link of some references</a:t>
-            </a:r>
-            <a:r>
-              <a:rPr lang="en-US" sz="2800"/>
-              <a:t> </a:t>
-            </a:r>
-            <a:endParaRPr lang="en-US" sz="2800"/>
-          </a:p>
-          <a:p>
-            <a:pPr marL="971550" lvl="1" indent="-514350">
-              <a:buAutoNum type="arabicPeriod"/>
-            </a:pPr>
-            <a:endParaRPr lang="en-US"/>
-          </a:p>
-          <a:p>
-            <a:pPr marL="971550" lvl="1" indent="-514350">
-              <a:buAutoNum type="arabicPeriod"/>
-            </a:pPr>
-            <a:endParaRPr lang="en-US"/>
           </a:p>
         </p:txBody>
       </p:sp>
@@ -5630,6 +5960,96 @@
   <p:clrMapOvr>
     <a:masterClrMapping/>
   </p:clrMapOvr>
+  <p:timing>
+    <p:tnLst>
+      <p:par>
+        <p:cTn id="1" dur="indefinite" restart="never" nodeType="tmRoot">
+          <p:childTnLst>
+            <p:seq concurrent="1" nextAc="seek">
+              <p:cTn id="2" dur="indefinite" nodeType="mainSeq">
+                <p:childTnLst>
+                  <p:par>
+                    <p:cTn id="3" fill="hold">
+                      <p:stCondLst>
+                        <p:cond delay="indefinite"/>
+                        <p:cond evt="onBegin" delay="0">
+                          <p:tn val="2"/>
+                        </p:cond>
+                      </p:stCondLst>
+                      <p:childTnLst>
+                        <p:par>
+                          <p:cTn id="4" fill="hold">
+                            <p:stCondLst>
+                              <p:cond delay="0"/>
+                            </p:stCondLst>
+                            <p:childTnLst>
+                              <p:par>
+                                <p:cTn id="5" presetID="13" presetClass="entr" presetSubtype="32" fill="hold" grpId="0" nodeType="withEffect">
+                                  <p:stCondLst>
+                                    <p:cond delay="0"/>
+                                  </p:stCondLst>
+                                  <p:childTnLst>
+                                    <p:set>
+                                      <p:cBhvr>
+                                        <p:cTn id="6" dur="1000" fill="hold">
+                                          <p:stCondLst>
+                                            <p:cond delay="0"/>
+                                          </p:stCondLst>
+                                        </p:cTn>
+                                        <p:tgtEl>
+                                          <p:spTgt spid="6"/>
+                                        </p:tgtEl>
+                                        <p:attrNameLst>
+                                          <p:attrName>style.visibility</p:attrName>
+                                        </p:attrNameLst>
+                                      </p:cBhvr>
+                                      <p:to>
+                                        <p:strVal val="visible"/>
+                                      </p:to>
+                                    </p:set>
+                                    <p:animEffect transition="in" filter="plus(out)">
+                                      <p:cBhvr>
+                                        <p:cTn id="7" dur="1000"/>
+                                        <p:tgtEl>
+                                          <p:spTgt spid="6"/>
+                                        </p:tgtEl>
+                                      </p:cBhvr>
+                                    </p:animEffect>
+                                  </p:childTnLst>
+                                </p:cTn>
+                              </p:par>
+                            </p:childTnLst>
+                          </p:cTn>
+                        </p:par>
+                      </p:childTnLst>
+                    </p:cTn>
+                  </p:par>
+                </p:childTnLst>
+              </p:cTn>
+              <p:prevCondLst>
+                <p:cond evt="onPrev" delay="0">
+                  <p:tgtEl>
+                    <p:sldTgt/>
+                  </p:tgtEl>
+                </p:cond>
+              </p:prevCondLst>
+              <p:nextCondLst>
+                <p:cond evt="onNext" delay="0">
+                  <p:tgtEl>
+                    <p:sldTgt/>
+                  </p:tgtEl>
+                </p:cond>
+              </p:nextCondLst>
+            </p:seq>
+          </p:childTnLst>
+        </p:cTn>
+      </p:par>
+    </p:tnLst>
+    <p:bldLst>
+      <p:bldP spid="6" grpId="0"/>
+      <p:bldP spid="6" grpId="1"/>
+    </p:bldLst>
+  </p:timing>
 </p:sld>
 </file>
 
@@ -5823,12 +6243,6 @@
 <file path=ppt/slides/slide4.xml><?xml version="1.0" encoding="utf-8"?>
 <p:sld xmlns:a="http://schemas.openxmlformats.org/drawingml/2006/main" xmlns:r="http://schemas.openxmlformats.org/officeDocument/2006/relationships" xmlns:p="http://schemas.openxmlformats.org/presentationml/2006/main">
   <p:cSld>
-    <p:bg>
-      <p:bgPr>
-        <a:noFill/>
-        <a:effectLst/>
-      </p:bgPr>
-    </p:bg>
     <p:spTree>
       <p:nvGrpSpPr>
         <p:cNvPr id="1" name=""/>
@@ -6666,12 +7080,20 @@
           <a:p>
             <a:pPr lvl="1"/>
             <a:r>
+              <a:rPr lang="en-US" i="1">
+                <a:solidFill>
+                  <a:schemeClr val="tx1"/>
+                </a:solidFill>
+              </a:rPr>
+              <a:t>Architect/Structture Pattern</a:t>
+            </a:r>
+            <a:r>
               <a:rPr lang="en-US">
                 <a:solidFill>
                   <a:schemeClr val="tx1"/>
                 </a:solidFill>
               </a:rPr>
-              <a:t>Architect/Structture Pattern : MVC, MVP, MVVM, ... </a:t>
+              <a:t> : MVC, MVP, MVVM, ... </a:t>
             </a:r>
             <a:endParaRPr lang="en-US">
               <a:solidFill>

</xml_diff>